<commit_message>
Signed-off-by: Wang Chengjun <wangchj04@gmail.com>
</commit_message>
<xml_diff>
--- a/Understaning Statitics/������Ϊ�������ԭ��.pptx
+++ b/Understaning Statitics/������Ϊ�������ԭ��.pptx
@@ -618,7 +618,7 @@
             <a:fld id="{DC0237A7-49AF-4759-9256-3305DF838F8D}" type="datetimeFigureOut">
               <a:rPr lang="zh-CN" altLang="en-US" smtClean="0"/>
               <a:pPr/>
-              <a:t>2012/1/5</a:t>
+              <a:t>2012/1/9</a:t>
             </a:fld>
             <a:endParaRPr lang="zh-CN" altLang="en-US"/>
           </a:p>
@@ -799,7 +799,7 @@
             <a:fld id="{DC0237A7-49AF-4759-9256-3305DF838F8D}" type="datetimeFigureOut">
               <a:rPr lang="zh-CN" altLang="en-US" smtClean="0"/>
               <a:pPr/>
-              <a:t>2012/1/5</a:t>
+              <a:t>2012/1/9</a:t>
             </a:fld>
             <a:endParaRPr lang="zh-CN" altLang="en-US"/>
           </a:p>
@@ -994,7 +994,7 @@
             <a:fld id="{DC0237A7-49AF-4759-9256-3305DF838F8D}" type="datetimeFigureOut">
               <a:rPr lang="zh-CN" altLang="en-US" smtClean="0"/>
               <a:pPr/>
-              <a:t>2012/1/5</a:t>
+              <a:t>2012/1/9</a:t>
             </a:fld>
             <a:endParaRPr lang="zh-CN" altLang="en-US"/>
           </a:p>
@@ -1179,7 +1179,7 @@
             <a:fld id="{DC0237A7-49AF-4759-9256-3305DF838F8D}" type="datetimeFigureOut">
               <a:rPr lang="zh-CN" altLang="en-US" smtClean="0"/>
               <a:pPr/>
-              <a:t>2012/1/5</a:t>
+              <a:t>2012/1/9</a:t>
             </a:fld>
             <a:endParaRPr lang="zh-CN" altLang="en-US"/>
           </a:p>
@@ -1386,7 +1386,7 @@
             <a:fld id="{DC0237A7-49AF-4759-9256-3305DF838F8D}" type="datetimeFigureOut">
               <a:rPr lang="zh-CN" altLang="en-US" smtClean="0"/>
               <a:pPr/>
-              <a:t>2012/1/5</a:t>
+              <a:t>2012/1/9</a:t>
             </a:fld>
             <a:endParaRPr lang="zh-CN" altLang="en-US"/>
           </a:p>
@@ -1689,7 +1689,7 @@
             <a:fld id="{DC0237A7-49AF-4759-9256-3305DF838F8D}" type="datetimeFigureOut">
               <a:rPr lang="zh-CN" altLang="en-US" smtClean="0"/>
               <a:pPr/>
-              <a:t>2012/1/5</a:t>
+              <a:t>2012/1/9</a:t>
             </a:fld>
             <a:endParaRPr lang="zh-CN" altLang="en-US"/>
           </a:p>
@@ -2131,7 +2131,7 @@
             <a:fld id="{DC0237A7-49AF-4759-9256-3305DF838F8D}" type="datetimeFigureOut">
               <a:rPr lang="zh-CN" altLang="en-US" smtClean="0"/>
               <a:pPr/>
-              <a:t>2012/1/5</a:t>
+              <a:t>2012/1/9</a:t>
             </a:fld>
             <a:endParaRPr lang="zh-CN" altLang="en-US"/>
           </a:p>
@@ -2264,7 +2264,7 @@
             <a:fld id="{DC0237A7-49AF-4759-9256-3305DF838F8D}" type="datetimeFigureOut">
               <a:rPr lang="zh-CN" altLang="en-US" smtClean="0"/>
               <a:pPr/>
-              <a:t>2012/1/5</a:t>
+              <a:t>2012/1/9</a:t>
             </a:fld>
             <a:endParaRPr lang="zh-CN" altLang="en-US"/>
           </a:p>
@@ -2374,7 +2374,7 @@
             <a:fld id="{DC0237A7-49AF-4759-9256-3305DF838F8D}" type="datetimeFigureOut">
               <a:rPr lang="zh-CN" altLang="en-US" smtClean="0"/>
               <a:pPr/>
-              <a:t>2012/1/5</a:t>
+              <a:t>2012/1/9</a:t>
             </a:fld>
             <a:endParaRPr lang="zh-CN" altLang="en-US"/>
           </a:p>
@@ -2666,7 +2666,7 @@
             <a:fld id="{DC0237A7-49AF-4759-9256-3305DF838F8D}" type="datetimeFigureOut">
               <a:rPr lang="zh-CN" altLang="en-US" smtClean="0"/>
               <a:pPr/>
-              <a:t>2012/1/5</a:t>
+              <a:t>2012/1/9</a:t>
             </a:fld>
             <a:endParaRPr lang="zh-CN" altLang="en-US"/>
           </a:p>
@@ -2939,7 +2939,7 @@
             <a:fld id="{DC0237A7-49AF-4759-9256-3305DF838F8D}" type="datetimeFigureOut">
               <a:rPr lang="zh-CN" altLang="en-US" smtClean="0"/>
               <a:pPr/>
-              <a:t>2012/1/5</a:t>
+              <a:t>2012/1/9</a:t>
             </a:fld>
             <a:endParaRPr lang="zh-CN" altLang="en-US"/>
           </a:p>
@@ -3560,7 +3560,7 @@
             <a:fld id="{DC0237A7-49AF-4759-9256-3305DF838F8D}" type="datetimeFigureOut">
               <a:rPr lang="zh-CN" altLang="en-US" smtClean="0"/>
               <a:pPr/>
-              <a:t>2012/1/5</a:t>
+              <a:t>2012/1/9</a:t>
             </a:fld>
             <a:endParaRPr lang="zh-CN" altLang="en-US"/>
           </a:p>
@@ -5020,7 +5020,7 @@
           <a:graphicData uri="http://schemas.openxmlformats.org/presentationml/2006/ole">
             <mc:AlternateContent xmlns:mc="http://schemas.openxmlformats.org/markup-compatibility/2006">
               <mc:Choice xmlns:v="urn:schemas-microsoft-com:vml" Requires="v">
-                <p:oleObj spid="_x0000_s62469" name="Equation" r:id="rId3" imgW="1866600" imgH="431640" progId="Equation.3">
+                <p:oleObj spid="_x0000_s62470" name="Equation" r:id="rId3" imgW="1866600" imgH="431640" progId="Equation.3">
                   <p:embed/>
                 </p:oleObj>
               </mc:Choice>
@@ -5504,7 +5504,7 @@
           <a:graphicData uri="http://schemas.openxmlformats.org/presentationml/2006/ole">
             <mc:AlternateContent xmlns:mc="http://schemas.openxmlformats.org/markup-compatibility/2006">
               <mc:Choice xmlns:v="urn:schemas-microsoft-com:vml" Requires="v">
-                <p:oleObj spid="_x0000_s47109" name="Equation" r:id="rId3" imgW="1866600" imgH="431640" progId="Equation.3">
+                <p:oleObj spid="_x0000_s47110" name="Equation" r:id="rId3" imgW="1866600" imgH="431640" progId="Equation.3">
                   <p:embed/>
                 </p:oleObj>
               </mc:Choice>
@@ -5696,7 +5696,7 @@
           <a:graphicData uri="http://schemas.openxmlformats.org/presentationml/2006/ole">
             <mc:AlternateContent xmlns:mc="http://schemas.openxmlformats.org/markup-compatibility/2006">
               <mc:Choice xmlns:v="urn:schemas-microsoft-com:vml" Requires="v">
-                <p:oleObj spid="_x0000_s46089" name="Equation" r:id="rId3" imgW="1295280" imgH="431640" progId="Equation.3">
+                <p:oleObj spid="_x0000_s46091" name="Equation" r:id="rId3" imgW="1295280" imgH="431640" progId="Equation.3">
                   <p:embed/>
                 </p:oleObj>
               </mc:Choice>
@@ -5766,7 +5766,7 @@
           <a:graphicData uri="http://schemas.openxmlformats.org/presentationml/2006/ole">
             <mc:AlternateContent xmlns:mc="http://schemas.openxmlformats.org/markup-compatibility/2006">
               <mc:Choice xmlns:v="urn:schemas-microsoft-com:vml" Requires="v">
-                <p:oleObj spid="_x0000_s46090" name="Equation" r:id="rId5" imgW="3517560" imgH="2971800" progId="Equation.DSMT4">
+                <p:oleObj spid="_x0000_s46092" name="Equation" r:id="rId5" imgW="3517560" imgH="2971800" progId="Equation.DSMT4">
                   <p:embed/>
                 </p:oleObj>
               </mc:Choice>
@@ -6206,7 +6206,7 @@
           <a:graphicData uri="http://schemas.openxmlformats.org/presentationml/2006/ole">
             <mc:AlternateContent xmlns:mc="http://schemas.openxmlformats.org/markup-compatibility/2006">
               <mc:Choice xmlns:v="urn:schemas-microsoft-com:vml" Requires="v">
-                <p:oleObj spid="_x0000_s30725" name="Equation" r:id="rId3" imgW="2273040" imgH="1015920" progId="Equation.3">
+                <p:oleObj spid="_x0000_s30726" name="Equation" r:id="rId3" imgW="2273040" imgH="1015920" progId="Equation.3">
                   <p:embed/>
                 </p:oleObj>
               </mc:Choice>
@@ -6658,7 +6658,7 @@
           <a:graphicData uri="http://schemas.openxmlformats.org/presentationml/2006/ole">
             <mc:AlternateContent xmlns:mc="http://schemas.openxmlformats.org/markup-compatibility/2006">
               <mc:Choice xmlns:v="urn:schemas-microsoft-com:vml" Requires="v">
-                <p:oleObj spid="_x0000_s1043" name="Equation" r:id="rId3" imgW="1129810" imgH="253890" progId="Equation.DSMT4">
+                <p:oleObj spid="_x0000_s1048" name="Equation" r:id="rId3" imgW="1129810" imgH="253890" progId="Equation.DSMT4">
                   <p:embed/>
                 </p:oleObj>
               </mc:Choice>
@@ -6766,7 +6766,7 @@
           <a:graphicData uri="http://schemas.openxmlformats.org/presentationml/2006/ole">
             <mc:AlternateContent xmlns:mc="http://schemas.openxmlformats.org/markup-compatibility/2006">
               <mc:Choice xmlns:v="urn:schemas-microsoft-com:vml" Requires="v">
-                <p:oleObj spid="_x0000_s1044" name="Equation" r:id="rId5" imgW="165028" imgH="228501" progId="Equation.DSMT4">
+                <p:oleObj spid="_x0000_s1049" name="Equation" r:id="rId5" imgW="165028" imgH="228501" progId="Equation.DSMT4">
                   <p:embed/>
                 </p:oleObj>
               </mc:Choice>
@@ -6874,7 +6874,7 @@
           <a:graphicData uri="http://schemas.openxmlformats.org/presentationml/2006/ole">
             <mc:AlternateContent xmlns:mc="http://schemas.openxmlformats.org/markup-compatibility/2006">
               <mc:Choice xmlns:v="urn:schemas-microsoft-com:vml" Requires="v">
-                <p:oleObj spid="_x0000_s1045" name="Equation" r:id="rId7" imgW="203112" imgH="393529" progId="Equation.DSMT4">
+                <p:oleObj spid="_x0000_s1050" name="Equation" r:id="rId7" imgW="203112" imgH="393529" progId="Equation.DSMT4">
                   <p:embed/>
                 </p:oleObj>
               </mc:Choice>
@@ -6982,7 +6982,7 @@
           <a:graphicData uri="http://schemas.openxmlformats.org/presentationml/2006/ole">
             <mc:AlternateContent xmlns:mc="http://schemas.openxmlformats.org/markup-compatibility/2006">
               <mc:Choice xmlns:v="urn:schemas-microsoft-com:vml" Requires="v">
-                <p:oleObj spid="_x0000_s1046" name="Equation" r:id="rId9" imgW="1498600" imgH="330200" progId="Equation.DSMT4">
+                <p:oleObj spid="_x0000_s1051" name="Equation" r:id="rId9" imgW="1498600" imgH="330200" progId="Equation.DSMT4">
                   <p:embed/>
                 </p:oleObj>
               </mc:Choice>
@@ -7090,7 +7090,7 @@
           <a:graphicData uri="http://schemas.openxmlformats.org/presentationml/2006/ole">
             <mc:AlternateContent xmlns:mc="http://schemas.openxmlformats.org/markup-compatibility/2006">
               <mc:Choice xmlns:v="urn:schemas-microsoft-com:vml" Requires="v">
-                <p:oleObj spid="_x0000_s1047" name="Equation" r:id="rId11" imgW="368140" imgH="253890" progId="Equation.DSMT4">
+                <p:oleObj spid="_x0000_s1052" name="Equation" r:id="rId11" imgW="368140" imgH="253890" progId="Equation.DSMT4">
                   <p:embed/>
                 </p:oleObj>
               </mc:Choice>
@@ -7223,7 +7223,7 @@
           <a:graphicData uri="http://schemas.openxmlformats.org/presentationml/2006/ole">
             <mc:AlternateContent xmlns:mc="http://schemas.openxmlformats.org/markup-compatibility/2006">
               <mc:Choice xmlns:v="urn:schemas-microsoft-com:vml" Requires="v">
-                <p:oleObj spid="_x0000_s63493" name="Equation" r:id="rId3" imgW="4012920" imgH="3225600" progId="Equation.DSMT4">
+                <p:oleObj spid="_x0000_s63494" name="Equation" r:id="rId3" imgW="4012920" imgH="3225600" progId="Equation.DSMT4">
                   <p:embed/>
                 </p:oleObj>
               </mc:Choice>
@@ -7582,7 +7582,7 @@
           <a:graphicData uri="http://schemas.openxmlformats.org/presentationml/2006/ole">
             <mc:AlternateContent xmlns:mc="http://schemas.openxmlformats.org/markup-compatibility/2006">
               <mc:Choice xmlns:v="urn:schemas-microsoft-com:vml" Requires="v">
-                <p:oleObj spid="_x0000_s2067" name="Equation" r:id="rId3" imgW="876300" imgH="330200" progId="Equation.DSMT4">
+                <p:oleObj spid="_x0000_s2073" name="Equation" r:id="rId3" imgW="876300" imgH="330200" progId="Equation.DSMT4">
                   <p:embed/>
                 </p:oleObj>
               </mc:Choice>
@@ -7652,7 +7652,7 @@
           <a:graphicData uri="http://schemas.openxmlformats.org/presentationml/2006/ole">
             <mc:AlternateContent xmlns:mc="http://schemas.openxmlformats.org/markup-compatibility/2006">
               <mc:Choice xmlns:v="urn:schemas-microsoft-com:vml" Requires="v">
-                <p:oleObj spid="_x0000_s2068" name="Equation" r:id="rId5" imgW="177646" imgH="228402" progId="Equation.DSMT4">
+                <p:oleObj spid="_x0000_s2074" name="Equation" r:id="rId5" imgW="177646" imgH="228402" progId="Equation.DSMT4">
                   <p:embed/>
                 </p:oleObj>
               </mc:Choice>
@@ -7722,7 +7722,7 @@
           <a:graphicData uri="http://schemas.openxmlformats.org/presentationml/2006/ole">
             <mc:AlternateContent xmlns:mc="http://schemas.openxmlformats.org/markup-compatibility/2006">
               <mc:Choice xmlns:v="urn:schemas-microsoft-com:vml" Requires="v">
-                <p:oleObj spid="_x0000_s2069" name="Equation" r:id="rId7" imgW="2768600" imgH="381000" progId="Equation.DSMT4">
+                <p:oleObj spid="_x0000_s2075" name="Equation" r:id="rId7" imgW="2768600" imgH="381000" progId="Equation.DSMT4">
                   <p:embed/>
                 </p:oleObj>
               </mc:Choice>
@@ -7792,7 +7792,7 @@
           <a:graphicData uri="http://schemas.openxmlformats.org/presentationml/2006/ole">
             <mc:AlternateContent xmlns:mc="http://schemas.openxmlformats.org/markup-compatibility/2006">
               <mc:Choice xmlns:v="urn:schemas-microsoft-com:vml" Requires="v">
-                <p:oleObj spid="_x0000_s2070" name="Equation" r:id="rId9" imgW="990170" imgH="253890" progId="Equation.DSMT4">
+                <p:oleObj spid="_x0000_s2076" name="Equation" r:id="rId9" imgW="990170" imgH="253890" progId="Equation.DSMT4">
                   <p:embed/>
                 </p:oleObj>
               </mc:Choice>
@@ -7862,7 +7862,7 @@
           <a:graphicData uri="http://schemas.openxmlformats.org/presentationml/2006/ole">
             <mc:AlternateContent xmlns:mc="http://schemas.openxmlformats.org/markup-compatibility/2006">
               <mc:Choice xmlns:v="urn:schemas-microsoft-com:vml" Requires="v">
-                <p:oleObj spid="_x0000_s2071" name="Equation" r:id="rId11" imgW="368140" imgH="253890" progId="Equation.DSMT4">
+                <p:oleObj spid="_x0000_s2077" name="Equation" r:id="rId11" imgW="368140" imgH="253890" progId="Equation.DSMT4">
                   <p:embed/>
                 </p:oleObj>
               </mc:Choice>
@@ -7932,7 +7932,7 @@
           <a:graphicData uri="http://schemas.openxmlformats.org/presentationml/2006/ole">
             <mc:AlternateContent xmlns:mc="http://schemas.openxmlformats.org/markup-compatibility/2006">
               <mc:Choice xmlns:v="urn:schemas-microsoft-com:vml" Requires="v">
-                <p:oleObj spid="_x0000_s2072" name="Equation" r:id="rId13" imgW="1308100" imgH="660400" progId="Equation.DSMT4">
+                <p:oleObj spid="_x0000_s2078" name="Equation" r:id="rId13" imgW="1308100" imgH="660400" progId="Equation.DSMT4">
                   <p:embed/>
                 </p:oleObj>
               </mc:Choice>
@@ -8271,7 +8271,7 @@
           <a:graphicData uri="http://schemas.openxmlformats.org/presentationml/2006/ole">
             <mc:AlternateContent xmlns:mc="http://schemas.openxmlformats.org/markup-compatibility/2006">
               <mc:Choice xmlns:v="urn:schemas-microsoft-com:vml" Requires="v">
-                <p:oleObj spid="_x0000_s22563" name="Equation" r:id="rId3" imgW="876300" imgH="330200" progId="Equation.DSMT4">
+                <p:oleObj spid="_x0000_s22572" name="Equation" r:id="rId3" imgW="876300" imgH="330200" progId="Equation.DSMT4">
                   <p:embed/>
                 </p:oleObj>
               </mc:Choice>
@@ -8341,7 +8341,7 @@
           <a:graphicData uri="http://schemas.openxmlformats.org/presentationml/2006/ole">
             <mc:AlternateContent xmlns:mc="http://schemas.openxmlformats.org/markup-compatibility/2006">
               <mc:Choice xmlns:v="urn:schemas-microsoft-com:vml" Requires="v">
-                <p:oleObj spid="_x0000_s22564" name="Equation" r:id="rId5" imgW="952087" imgH="330057" progId="Equation.DSMT4">
+                <p:oleObj spid="_x0000_s22573" name="Equation" r:id="rId5" imgW="952087" imgH="330057" progId="Equation.DSMT4">
                   <p:embed/>
                 </p:oleObj>
               </mc:Choice>
@@ -8411,7 +8411,7 @@
           <a:graphicData uri="http://schemas.openxmlformats.org/presentationml/2006/ole">
             <mc:AlternateContent xmlns:mc="http://schemas.openxmlformats.org/markup-compatibility/2006">
               <mc:Choice xmlns:v="urn:schemas-microsoft-com:vml" Requires="v">
-                <p:oleObj spid="_x0000_s22565" name="Equation" r:id="rId7" imgW="177646" imgH="228402" progId="Equation.DSMT4">
+                <p:oleObj spid="_x0000_s22574" name="Equation" r:id="rId7" imgW="177646" imgH="228402" progId="Equation.DSMT4">
                   <p:embed/>
                 </p:oleObj>
               </mc:Choice>
@@ -8481,7 +8481,7 @@
           <a:graphicData uri="http://schemas.openxmlformats.org/presentationml/2006/ole">
             <mc:AlternateContent xmlns:mc="http://schemas.openxmlformats.org/markup-compatibility/2006">
               <mc:Choice xmlns:v="urn:schemas-microsoft-com:vml" Requires="v">
-                <p:oleObj spid="_x0000_s22566" name="Equation" r:id="rId9" imgW="190500" imgH="228600" progId="Equation.DSMT4">
+                <p:oleObj spid="_x0000_s22575" name="Equation" r:id="rId9" imgW="190500" imgH="228600" progId="Equation.DSMT4">
                   <p:embed/>
                 </p:oleObj>
               </mc:Choice>
@@ -8551,7 +8551,7 @@
           <a:graphicData uri="http://schemas.openxmlformats.org/presentationml/2006/ole">
             <mc:AlternateContent xmlns:mc="http://schemas.openxmlformats.org/markup-compatibility/2006">
               <mc:Choice xmlns:v="urn:schemas-microsoft-com:vml" Requires="v">
-                <p:oleObj spid="_x0000_s22567" name="Equation" r:id="rId11" imgW="4114800" imgH="381000" progId="Equation.DSMT4">
+                <p:oleObj spid="_x0000_s22576" name="Equation" r:id="rId11" imgW="4114800" imgH="381000" progId="Equation.DSMT4">
                   <p:embed/>
                 </p:oleObj>
               </mc:Choice>
@@ -8621,7 +8621,7 @@
           <a:graphicData uri="http://schemas.openxmlformats.org/presentationml/2006/ole">
             <mc:AlternateContent xmlns:mc="http://schemas.openxmlformats.org/markup-compatibility/2006">
               <mc:Choice xmlns:v="urn:schemas-microsoft-com:vml" Requires="v">
-                <p:oleObj spid="_x0000_s22568" name="Equation" r:id="rId13" imgW="1447172" imgH="253890" progId="Equation.DSMT4">
+                <p:oleObj spid="_x0000_s22577" name="Equation" r:id="rId13" imgW="1447172" imgH="253890" progId="Equation.DSMT4">
                   <p:embed/>
                 </p:oleObj>
               </mc:Choice>
@@ -8691,7 +8691,7 @@
           <a:graphicData uri="http://schemas.openxmlformats.org/presentationml/2006/ole">
             <mc:AlternateContent xmlns:mc="http://schemas.openxmlformats.org/markup-compatibility/2006">
               <mc:Choice xmlns:v="urn:schemas-microsoft-com:vml" Requires="v">
-                <p:oleObj spid="_x0000_s22569" name="Equation" r:id="rId15" imgW="825500" imgH="419100" progId="Equation.DSMT4">
+                <p:oleObj spid="_x0000_s22578" name="Equation" r:id="rId15" imgW="825500" imgH="419100" progId="Equation.DSMT4">
                   <p:embed/>
                 </p:oleObj>
               </mc:Choice>
@@ -8799,7 +8799,7 @@
           <a:graphicData uri="http://schemas.openxmlformats.org/presentationml/2006/ole">
             <mc:AlternateContent xmlns:mc="http://schemas.openxmlformats.org/markup-compatibility/2006">
               <mc:Choice xmlns:v="urn:schemas-microsoft-com:vml" Requires="v">
-                <p:oleObj spid="_x0000_s22570" name="Equation" r:id="rId17" imgW="190500" imgH="228600" progId="Equation.DSMT4">
+                <p:oleObj spid="_x0000_s22579" name="Equation" r:id="rId17" imgW="190500" imgH="228600" progId="Equation.DSMT4">
                   <p:embed/>
                 </p:oleObj>
               </mc:Choice>
@@ -8869,7 +8869,7 @@
           <a:graphicData uri="http://schemas.openxmlformats.org/presentationml/2006/ole">
             <mc:AlternateContent xmlns:mc="http://schemas.openxmlformats.org/markup-compatibility/2006">
               <mc:Choice xmlns:v="urn:schemas-microsoft-com:vml" Requires="v">
-                <p:oleObj spid="_x0000_s22571" name="Equation" r:id="rId18" imgW="863280" imgH="279360" progId="Equation.DSMT4">
+                <p:oleObj spid="_x0000_s22580" name="Equation" r:id="rId18" imgW="863280" imgH="279360" progId="Equation.DSMT4">
                   <p:embed/>
                 </p:oleObj>
               </mc:Choice>
@@ -9524,7 +9524,7 @@
           <a:graphicData uri="http://schemas.openxmlformats.org/presentationml/2006/ole">
             <mc:AlternateContent xmlns:mc="http://schemas.openxmlformats.org/markup-compatibility/2006">
               <mc:Choice xmlns:v="urn:schemas-microsoft-com:vml" Requires="v">
-                <p:oleObj spid="_x0000_s23583" name="Equation" r:id="rId3" imgW="876300" imgH="330200" progId="Equation.DSMT4">
+                <p:oleObj spid="_x0000_s23593" name="Equation" r:id="rId3" imgW="876300" imgH="330200" progId="Equation.DSMT4">
                   <p:embed/>
                 </p:oleObj>
               </mc:Choice>
@@ -9594,7 +9594,7 @@
           <a:graphicData uri="http://schemas.openxmlformats.org/presentationml/2006/ole">
             <mc:AlternateContent xmlns:mc="http://schemas.openxmlformats.org/markup-compatibility/2006">
               <mc:Choice xmlns:v="urn:schemas-microsoft-com:vml" Requires="v">
-                <p:oleObj spid="_x0000_s23584" name="Equation" r:id="rId5" imgW="1129810" imgH="330057" progId="Equation.DSMT4">
+                <p:oleObj spid="_x0000_s23594" name="Equation" r:id="rId5" imgW="1129810" imgH="330057" progId="Equation.DSMT4">
                   <p:embed/>
                 </p:oleObj>
               </mc:Choice>
@@ -9664,7 +9664,7 @@
           <a:graphicData uri="http://schemas.openxmlformats.org/presentationml/2006/ole">
             <mc:AlternateContent xmlns:mc="http://schemas.openxmlformats.org/markup-compatibility/2006">
               <mc:Choice xmlns:v="urn:schemas-microsoft-com:vml" Requires="v">
-                <p:oleObj spid="_x0000_s23585" name="Equation" r:id="rId7" imgW="177646" imgH="228402" progId="Equation.DSMT4">
+                <p:oleObj spid="_x0000_s23595" name="Equation" r:id="rId7" imgW="177646" imgH="228402" progId="Equation.DSMT4">
                   <p:embed/>
                 </p:oleObj>
               </mc:Choice>
@@ -9734,7 +9734,7 @@
           <a:graphicData uri="http://schemas.openxmlformats.org/presentationml/2006/ole">
             <mc:AlternateContent xmlns:mc="http://schemas.openxmlformats.org/markup-compatibility/2006">
               <mc:Choice xmlns:v="urn:schemas-microsoft-com:vml" Requires="v">
-                <p:oleObj spid="_x0000_s23586" name="Equation" r:id="rId9" imgW="190500" imgH="228600" progId="Equation.DSMT4">
+                <p:oleObj spid="_x0000_s23596" name="Equation" r:id="rId9" imgW="190500" imgH="228600" progId="Equation.DSMT4">
                   <p:embed/>
                 </p:oleObj>
               </mc:Choice>
@@ -9804,7 +9804,7 @@
           <a:graphicData uri="http://schemas.openxmlformats.org/presentationml/2006/ole">
             <mc:AlternateContent xmlns:mc="http://schemas.openxmlformats.org/markup-compatibility/2006">
               <mc:Choice xmlns:v="urn:schemas-microsoft-com:vml" Requires="v">
-                <p:oleObj spid="_x0000_s23587" name="Equation" r:id="rId11" imgW="4279900" imgH="381000" progId="Equation.DSMT4">
+                <p:oleObj spid="_x0000_s23597" name="Equation" r:id="rId11" imgW="4279900" imgH="381000" progId="Equation.DSMT4">
                   <p:embed/>
                 </p:oleObj>
               </mc:Choice>
@@ -9874,7 +9874,7 @@
           <a:graphicData uri="http://schemas.openxmlformats.org/presentationml/2006/ole">
             <mc:AlternateContent xmlns:mc="http://schemas.openxmlformats.org/markup-compatibility/2006">
               <mc:Choice xmlns:v="urn:schemas-microsoft-com:vml" Requires="v">
-                <p:oleObj spid="_x0000_s23588" name="Equation" r:id="rId13" imgW="1625600" imgH="254000" progId="Equation.DSMT4">
+                <p:oleObj spid="_x0000_s23598" name="Equation" r:id="rId13" imgW="1625600" imgH="254000" progId="Equation.DSMT4">
                   <p:embed/>
                 </p:oleObj>
               </mc:Choice>
@@ -9944,7 +9944,7 @@
           <a:graphicData uri="http://schemas.openxmlformats.org/presentationml/2006/ole">
             <mc:AlternateContent xmlns:mc="http://schemas.openxmlformats.org/markup-compatibility/2006">
               <mc:Choice xmlns:v="urn:schemas-microsoft-com:vml" Requires="v">
-                <p:oleObj spid="_x0000_s23589" name="Equation" r:id="rId15" imgW="1612800" imgH="279360" progId="Equation.DSMT4">
+                <p:oleObj spid="_x0000_s23599" name="Equation" r:id="rId15" imgW="1612800" imgH="279360" progId="Equation.DSMT4">
                   <p:embed/>
                 </p:oleObj>
               </mc:Choice>
@@ -10014,7 +10014,7 @@
           <a:graphicData uri="http://schemas.openxmlformats.org/presentationml/2006/ole">
             <mc:AlternateContent xmlns:mc="http://schemas.openxmlformats.org/markup-compatibility/2006">
               <mc:Choice xmlns:v="urn:schemas-microsoft-com:vml" Requires="v">
-                <p:oleObj spid="_x0000_s23590" name="Equation" r:id="rId17" imgW="545626" imgH="177646" progId="Equation.DSMT4">
+                <p:oleObj spid="_x0000_s23600" name="Equation" r:id="rId17" imgW="545626" imgH="177646" progId="Equation.DSMT4">
                   <p:embed/>
                 </p:oleObj>
               </mc:Choice>
@@ -10084,7 +10084,7 @@
           <a:graphicData uri="http://schemas.openxmlformats.org/presentationml/2006/ole">
             <mc:AlternateContent xmlns:mc="http://schemas.openxmlformats.org/markup-compatibility/2006">
               <mc:Choice xmlns:v="urn:schemas-microsoft-com:vml" Requires="v">
-                <p:oleObj spid="_x0000_s23591" name="Equation" r:id="rId19" imgW="1143000" imgH="419100" progId="Equation.DSMT4">
+                <p:oleObj spid="_x0000_s23601" name="Equation" r:id="rId19" imgW="1143000" imgH="419100" progId="Equation.DSMT4">
                   <p:embed/>
                 </p:oleObj>
               </mc:Choice>
@@ -10154,7 +10154,7 @@
           <a:graphicData uri="http://schemas.openxmlformats.org/presentationml/2006/ole">
             <mc:AlternateContent xmlns:mc="http://schemas.openxmlformats.org/markup-compatibility/2006">
               <mc:Choice xmlns:v="urn:schemas-microsoft-com:vml" Requires="v">
-                <p:oleObj spid="_x0000_s23592" name="Equation" r:id="rId21" imgW="393529" imgH="253890" progId="Equation.DSMT4">
+                <p:oleObj spid="_x0000_s23602" name="Equation" r:id="rId21" imgW="393529" imgH="253890" progId="Equation.DSMT4">
                   <p:embed/>
                 </p:oleObj>
               </mc:Choice>
@@ -10434,7 +10434,7 @@
           <a:graphicData uri="http://schemas.openxmlformats.org/presentationml/2006/ole">
             <mc:AlternateContent xmlns:mc="http://schemas.openxmlformats.org/markup-compatibility/2006">
               <mc:Choice xmlns:v="urn:schemas-microsoft-com:vml" Requires="v">
-                <p:oleObj spid="_x0000_s24595" name="Equation" r:id="rId3" imgW="1816100" imgH="279400" progId="Equation.DSMT4">
+                <p:oleObj spid="_x0000_s24601" name="Equation" r:id="rId3" imgW="1816100" imgH="279400" progId="Equation.DSMT4">
                   <p:embed/>
                 </p:oleObj>
               </mc:Choice>
@@ -10504,7 +10504,7 @@
           <a:graphicData uri="http://schemas.openxmlformats.org/presentationml/2006/ole">
             <mc:AlternateContent xmlns:mc="http://schemas.openxmlformats.org/markup-compatibility/2006">
               <mc:Choice xmlns:v="urn:schemas-microsoft-com:vml" Requires="v">
-                <p:oleObj spid="_x0000_s24596" name="Equation" r:id="rId5" imgW="177646" imgH="228402" progId="Equation.DSMT4">
+                <p:oleObj spid="_x0000_s24602" name="Equation" r:id="rId5" imgW="177646" imgH="228402" progId="Equation.DSMT4">
                   <p:embed/>
                 </p:oleObj>
               </mc:Choice>
@@ -10574,7 +10574,7 @@
           <a:graphicData uri="http://schemas.openxmlformats.org/presentationml/2006/ole">
             <mc:AlternateContent xmlns:mc="http://schemas.openxmlformats.org/markup-compatibility/2006">
               <mc:Choice xmlns:v="urn:schemas-microsoft-com:vml" Requires="v">
-                <p:oleObj spid="_x0000_s24597" name="Equation" r:id="rId7" imgW="380835" imgH="253890" progId="Equation.DSMT4">
+                <p:oleObj spid="_x0000_s24603" name="Equation" r:id="rId7" imgW="380835" imgH="253890" progId="Equation.DSMT4">
                   <p:embed/>
                 </p:oleObj>
               </mc:Choice>
@@ -10644,7 +10644,7 @@
           <a:graphicData uri="http://schemas.openxmlformats.org/presentationml/2006/ole">
             <mc:AlternateContent xmlns:mc="http://schemas.openxmlformats.org/markup-compatibility/2006">
               <mc:Choice xmlns:v="urn:schemas-microsoft-com:vml" Requires="v">
-                <p:oleObj spid="_x0000_s24598" name="Equation" r:id="rId9" imgW="139700" imgH="228600" progId="Equation.DSMT4">
+                <p:oleObj spid="_x0000_s24604" name="Equation" r:id="rId9" imgW="139700" imgH="228600" progId="Equation.DSMT4">
                   <p:embed/>
                 </p:oleObj>
               </mc:Choice>
@@ -10714,7 +10714,7 @@
           <a:graphicData uri="http://schemas.openxmlformats.org/presentationml/2006/ole">
             <mc:AlternateContent xmlns:mc="http://schemas.openxmlformats.org/markup-compatibility/2006">
               <mc:Choice xmlns:v="urn:schemas-microsoft-com:vml" Requires="v">
-                <p:oleObj spid="_x0000_s24599" name="Equation" r:id="rId11" imgW="1244600" imgH="279400" progId="Equation.DSMT4">
+                <p:oleObj spid="_x0000_s24605" name="Equation" r:id="rId11" imgW="1244600" imgH="279400" progId="Equation.DSMT4">
                   <p:embed/>
                 </p:oleObj>
               </mc:Choice>
@@ -10784,7 +10784,7 @@
           <a:graphicData uri="http://schemas.openxmlformats.org/presentationml/2006/ole">
             <mc:AlternateContent xmlns:mc="http://schemas.openxmlformats.org/markup-compatibility/2006">
               <mc:Choice xmlns:v="urn:schemas-microsoft-com:vml" Requires="v">
-                <p:oleObj spid="_x0000_s24600" name="Equation" r:id="rId13" imgW="291847" imgH="177646" progId="Equation.DSMT4">
+                <p:oleObj spid="_x0000_s24606" name="Equation" r:id="rId13" imgW="291847" imgH="177646" progId="Equation.DSMT4">
                   <p:embed/>
                 </p:oleObj>
               </mc:Choice>
@@ -12977,7 +12977,7 @@
           <a:graphicData uri="http://schemas.openxmlformats.org/presentationml/2006/ole">
             <mc:AlternateContent xmlns:mc="http://schemas.openxmlformats.org/markup-compatibility/2006">
               <mc:Choice xmlns:v="urn:schemas-microsoft-com:vml" Requires="v">
-                <p:oleObj spid="_x0000_s28680" name="Equation" r:id="rId4" imgW="685800" imgH="228600" progId="Equation.DSMT4">
+                <p:oleObj spid="_x0000_s28681" name="Equation" r:id="rId4" imgW="685800" imgH="228600" progId="Equation.DSMT4">
                   <p:embed/>
                 </p:oleObj>
               </mc:Choice>

</xml_diff>